<commit_message>
technical changes for final submission
</commit_message>
<xml_diff>
--- a/figure_edits.pptx
+++ b/figure_edits.pptx
@@ -5,10 +5,11 @@
     <p:sldMasterId id="2147483648" r:id="rId1"/>
   </p:sldMasterIdLst>
   <p:notesMasterIdLst>
-    <p:notesMasterId r:id="rId3"/>
+    <p:notesMasterId r:id="rId4"/>
   </p:notesMasterIdLst>
   <p:sldIdLst>
     <p:sldId id="256" r:id="rId2"/>
+    <p:sldId id="257" r:id="rId3"/>
   </p:sldIdLst>
   <p:sldSz cx="12192000" cy="6858000"/>
   <p:notesSz cx="6858000" cy="9144000"/>
@@ -107,6 +108,11 @@
       </a:defRPr>
     </a:lvl9pPr>
   </p:defaultTextStyle>
+  <p:extLst>
+    <p:ext uri="{EFAFB233-063F-42B5-8137-9DF3F51BA10A}">
+      <p15:sldGuideLst xmlns:p15="http://schemas.microsoft.com/office/powerpoint/2012/main"/>
+    </p:ext>
+  </p:extLst>
 </p:presentation>
 </file>
 
@@ -192,7 +198,7 @@
           <a:p>
             <a:fld id="{843E6239-DE55-9747-B94C-F8B9B977E785}" type="datetimeFigureOut">
               <a:rPr lang="en-GB" smtClean="0"/>
-              <a:t>11/01/2019</a:t>
+              <a:t>29/01/2019</a:t>
             </a:fld>
             <a:endParaRPr lang="en-GB"/>
           </a:p>
@@ -544,6 +550,90 @@
 </p:notes>
 </file>
 
+<file path=ppt/notesSlides/notesSlide2.xml><?xml version="1.0" encoding="utf-8"?>
+<p:notes xmlns:a="http://schemas.openxmlformats.org/drawingml/2006/main" xmlns:r="http://schemas.openxmlformats.org/officeDocument/2006/relationships" xmlns:p="http://schemas.openxmlformats.org/presentationml/2006/main">
+  <p:cSld>
+    <p:spTree>
+      <p:nvGrpSpPr>
+        <p:cNvPr id="1" name=""/>
+        <p:cNvGrpSpPr/>
+        <p:nvPr/>
+      </p:nvGrpSpPr>
+      <p:grpSpPr>
+        <a:xfrm>
+          <a:off x="0" y="0"/>
+          <a:ext cx="0" cy="0"/>
+          <a:chOff x="0" y="0"/>
+          <a:chExt cx="0" cy="0"/>
+        </a:xfrm>
+      </p:grpSpPr>
+      <p:sp>
+        <p:nvSpPr>
+          <p:cNvPr id="2" name="Slide Image Placeholder 1"/>
+          <p:cNvSpPr>
+            <a:spLocks noGrp="1" noRot="1" noChangeAspect="1"/>
+          </p:cNvSpPr>
+          <p:nvPr>
+            <p:ph type="sldImg"/>
+          </p:nvPr>
+        </p:nvSpPr>
+        <p:spPr/>
+      </p:sp>
+      <p:sp>
+        <p:nvSpPr>
+          <p:cNvPr id="3" name="Notes Placeholder 2"/>
+          <p:cNvSpPr>
+            <a:spLocks noGrp="1"/>
+          </p:cNvSpPr>
+          <p:nvPr>
+            <p:ph type="body" idx="1"/>
+          </p:nvPr>
+        </p:nvSpPr>
+        <p:spPr/>
+        <p:txBody>
+          <a:bodyPr/>
+          <a:lstStyle/>
+          <a:p>
+            <a:endParaRPr lang="en-GB" dirty="0"/>
+          </a:p>
+        </p:txBody>
+      </p:sp>
+      <p:sp>
+        <p:nvSpPr>
+          <p:cNvPr id="4" name="Slide Number Placeholder 3"/>
+          <p:cNvSpPr>
+            <a:spLocks noGrp="1"/>
+          </p:cNvSpPr>
+          <p:nvPr>
+            <p:ph type="sldNum" sz="quarter" idx="10"/>
+          </p:nvPr>
+        </p:nvSpPr>
+        <p:spPr/>
+        <p:txBody>
+          <a:bodyPr/>
+          <a:lstStyle/>
+          <a:p>
+            <a:fld id="{2D030ED2-1F7C-5B43-B71F-0FDA1CD45D82}" type="slidenum">
+              <a:rPr lang="en-GB" smtClean="0"/>
+              <a:t>2</a:t>
+            </a:fld>
+            <a:endParaRPr lang="en-GB"/>
+          </a:p>
+        </p:txBody>
+      </p:sp>
+    </p:spTree>
+    <p:extLst>
+      <p:ext uri="{BB962C8B-B14F-4D97-AF65-F5344CB8AC3E}">
+        <p14:creationId xmlns:p14="http://schemas.microsoft.com/office/powerpoint/2010/main" val="157694823"/>
+      </p:ext>
+    </p:extLst>
+  </p:cSld>
+  <p:clrMapOvr>
+    <a:masterClrMapping/>
+  </p:clrMapOvr>
+</p:notes>
+</file>
+
 <file path=ppt/slideLayouts/slideLayout1.xml><?xml version="1.0" encoding="utf-8"?>
 <p:sldLayout xmlns:a="http://schemas.openxmlformats.org/drawingml/2006/main" xmlns:r="http://schemas.openxmlformats.org/officeDocument/2006/relationships" xmlns:p="http://schemas.openxmlformats.org/presentationml/2006/main" type="title" preserve="1">
   <p:cSld name="Title Slide">
@@ -693,7 +783,7 @@
           <a:p>
             <a:fld id="{D6662CD2-7124-424E-9ACC-F2B4544752EC}" type="datetimeFigureOut">
               <a:rPr lang="en-GB" smtClean="0"/>
-              <a:t>11/01/2019</a:t>
+              <a:t>29/01/2019</a:t>
             </a:fld>
             <a:endParaRPr lang="en-GB"/>
           </a:p>
@@ -893,7 +983,7 @@
           <a:p>
             <a:fld id="{D6662CD2-7124-424E-9ACC-F2B4544752EC}" type="datetimeFigureOut">
               <a:rPr lang="en-GB" smtClean="0"/>
-              <a:t>11/01/2019</a:t>
+              <a:t>29/01/2019</a:t>
             </a:fld>
             <a:endParaRPr lang="en-GB"/>
           </a:p>
@@ -1103,7 +1193,7 @@
           <a:p>
             <a:fld id="{D6662CD2-7124-424E-9ACC-F2B4544752EC}" type="datetimeFigureOut">
               <a:rPr lang="en-GB" smtClean="0"/>
-              <a:t>11/01/2019</a:t>
+              <a:t>29/01/2019</a:t>
             </a:fld>
             <a:endParaRPr lang="en-GB"/>
           </a:p>
@@ -1303,7 +1393,7 @@
           <a:p>
             <a:fld id="{D6662CD2-7124-424E-9ACC-F2B4544752EC}" type="datetimeFigureOut">
               <a:rPr lang="en-GB" smtClean="0"/>
-              <a:t>11/01/2019</a:t>
+              <a:t>29/01/2019</a:t>
             </a:fld>
             <a:endParaRPr lang="en-GB"/>
           </a:p>
@@ -1579,7 +1669,7 @@
           <a:p>
             <a:fld id="{D6662CD2-7124-424E-9ACC-F2B4544752EC}" type="datetimeFigureOut">
               <a:rPr lang="en-GB" smtClean="0"/>
-              <a:t>11/01/2019</a:t>
+              <a:t>29/01/2019</a:t>
             </a:fld>
             <a:endParaRPr lang="en-GB"/>
           </a:p>
@@ -1847,7 +1937,7 @@
           <a:p>
             <a:fld id="{D6662CD2-7124-424E-9ACC-F2B4544752EC}" type="datetimeFigureOut">
               <a:rPr lang="en-GB" smtClean="0"/>
-              <a:t>11/01/2019</a:t>
+              <a:t>29/01/2019</a:t>
             </a:fld>
             <a:endParaRPr lang="en-GB"/>
           </a:p>
@@ -2262,7 +2352,7 @@
           <a:p>
             <a:fld id="{D6662CD2-7124-424E-9ACC-F2B4544752EC}" type="datetimeFigureOut">
               <a:rPr lang="en-GB" smtClean="0"/>
-              <a:t>11/01/2019</a:t>
+              <a:t>29/01/2019</a:t>
             </a:fld>
             <a:endParaRPr lang="en-GB"/>
           </a:p>
@@ -2404,7 +2494,7 @@
           <a:p>
             <a:fld id="{D6662CD2-7124-424E-9ACC-F2B4544752EC}" type="datetimeFigureOut">
               <a:rPr lang="en-GB" smtClean="0"/>
-              <a:t>11/01/2019</a:t>
+              <a:t>29/01/2019</a:t>
             </a:fld>
             <a:endParaRPr lang="en-GB"/>
           </a:p>
@@ -2517,7 +2607,7 @@
           <a:p>
             <a:fld id="{D6662CD2-7124-424E-9ACC-F2B4544752EC}" type="datetimeFigureOut">
               <a:rPr lang="en-GB" smtClean="0"/>
-              <a:t>11/01/2019</a:t>
+              <a:t>29/01/2019</a:t>
             </a:fld>
             <a:endParaRPr lang="en-GB"/>
           </a:p>
@@ -2830,7 +2920,7 @@
           <a:p>
             <a:fld id="{D6662CD2-7124-424E-9ACC-F2B4544752EC}" type="datetimeFigureOut">
               <a:rPr lang="en-GB" smtClean="0"/>
-              <a:t>11/01/2019</a:t>
+              <a:t>29/01/2019</a:t>
             </a:fld>
             <a:endParaRPr lang="en-GB"/>
           </a:p>
@@ -3119,7 +3209,7 @@
           <a:p>
             <a:fld id="{D6662CD2-7124-424E-9ACC-F2B4544752EC}" type="datetimeFigureOut">
               <a:rPr lang="en-GB" smtClean="0"/>
-              <a:t>11/01/2019</a:t>
+              <a:t>29/01/2019</a:t>
             </a:fld>
             <a:endParaRPr lang="en-GB"/>
           </a:p>
@@ -3362,7 +3452,7 @@
           <a:p>
             <a:fld id="{D6662CD2-7124-424E-9ACC-F2B4544752EC}" type="datetimeFigureOut">
               <a:rPr lang="en-GB" smtClean="0"/>
-              <a:t>11/01/2019</a:t>
+              <a:t>29/01/2019</a:t>
             </a:fld>
             <a:endParaRPr lang="en-GB"/>
           </a:p>
@@ -3944,6 +4034,195 @@
     <p:extLst>
       <p:ext uri="{BB962C8B-B14F-4D97-AF65-F5344CB8AC3E}">
         <p14:creationId xmlns:p14="http://schemas.microsoft.com/office/powerpoint/2010/main" val="3130811231"/>
+      </p:ext>
+    </p:extLst>
+  </p:cSld>
+  <p:clrMapOvr>
+    <a:masterClrMapping/>
+  </p:clrMapOvr>
+</p:sld>
+</file>
+
+<file path=ppt/slides/slide2.xml><?xml version="1.0" encoding="utf-8"?>
+<p:sld xmlns:a="http://schemas.openxmlformats.org/drawingml/2006/main" xmlns:r="http://schemas.openxmlformats.org/officeDocument/2006/relationships" xmlns:p="http://schemas.openxmlformats.org/presentationml/2006/main">
+  <p:cSld>
+    <p:spTree>
+      <p:nvGrpSpPr>
+        <p:cNvPr id="1" name=""/>
+        <p:cNvGrpSpPr/>
+        <p:nvPr/>
+      </p:nvGrpSpPr>
+      <p:grpSpPr>
+        <a:xfrm>
+          <a:off x="0" y="0"/>
+          <a:ext cx="0" cy="0"/>
+          <a:chOff x="0" y="0"/>
+          <a:chExt cx="0" cy="0"/>
+        </a:xfrm>
+      </p:grpSpPr>
+      <p:grpSp>
+        <p:nvGrpSpPr>
+          <p:cNvPr id="4" name="Group 3">
+            <a:extLst>
+              <a:ext uri="{FF2B5EF4-FFF2-40B4-BE49-F238E27FC236}">
+                <a16:creationId xmlns:a16="http://schemas.microsoft.com/office/drawing/2014/main" id="{2875F077-5A7A-3545-844E-56CC4300B3DF}"/>
+              </a:ext>
+            </a:extLst>
+          </p:cNvPr>
+          <p:cNvGrpSpPr/>
+          <p:nvPr/>
+        </p:nvGrpSpPr>
+        <p:grpSpPr>
+          <a:xfrm>
+            <a:off x="-497304" y="1051200"/>
+            <a:ext cx="9459704" cy="8489603"/>
+            <a:chOff x="-497304" y="1051200"/>
+            <a:chExt cx="9459704" cy="8489603"/>
+          </a:xfrm>
+        </p:grpSpPr>
+        <p:pic>
+          <p:nvPicPr>
+            <p:cNvPr id="3" name="Picture 2">
+              <a:extLst>
+                <a:ext uri="{FF2B5EF4-FFF2-40B4-BE49-F238E27FC236}">
+                  <a16:creationId xmlns:a16="http://schemas.microsoft.com/office/drawing/2014/main" id="{66ECE4C1-7FC8-184B-ACF3-8EB08EECA106}"/>
+                </a:ext>
+              </a:extLst>
+            </p:cNvPr>
+            <p:cNvPicPr>
+              <a:picLocks noChangeAspect="1"/>
+            </p:cNvPicPr>
+            <p:nvPr/>
+          </p:nvPicPr>
+          <p:blipFill>
+            <a:blip r:embed="rId3"/>
+            <a:stretch>
+              <a:fillRect/>
+            </a:stretch>
+          </p:blipFill>
+          <p:spPr>
+            <a:xfrm>
+              <a:off x="3222000" y="1051200"/>
+              <a:ext cx="5740400" cy="4457700"/>
+            </a:xfrm>
+            <a:prstGeom prst="rect">
+              <a:avLst/>
+            </a:prstGeom>
+          </p:spPr>
+        </p:pic>
+        <p:sp>
+          <p:nvSpPr>
+            <p:cNvPr id="8" name="Arc 7">
+              <a:extLst>
+                <a:ext uri="{FF2B5EF4-FFF2-40B4-BE49-F238E27FC236}">
+                  <a16:creationId xmlns:a16="http://schemas.microsoft.com/office/drawing/2014/main" id="{190FF0C1-6D56-1F49-894A-58916A33AD57}"/>
+                </a:ext>
+              </a:extLst>
+            </p:cNvPr>
+            <p:cNvSpPr/>
+            <p:nvPr/>
+          </p:nvSpPr>
+          <p:spPr>
+            <a:xfrm>
+              <a:off x="-497304" y="1475875"/>
+              <a:ext cx="8074148" cy="8064928"/>
+            </a:xfrm>
+            <a:prstGeom prst="arc">
+              <a:avLst>
+                <a:gd name="adj1" fmla="val 16984839"/>
+                <a:gd name="adj2" fmla="val 21125606"/>
+              </a:avLst>
+            </a:prstGeom>
+            <a:ln w="22225">
+              <a:solidFill>
+                <a:schemeClr val="bg1"/>
+              </a:solidFill>
+              <a:headEnd type="stealth" w="lg" len="lg"/>
+              <a:tailEnd type="none" w="lg" len="lg"/>
+            </a:ln>
+          </p:spPr>
+          <p:style>
+            <a:lnRef idx="1">
+              <a:schemeClr val="accent1"/>
+            </a:lnRef>
+            <a:fillRef idx="0">
+              <a:schemeClr val="accent1"/>
+            </a:fillRef>
+            <a:effectRef idx="0">
+              <a:schemeClr val="accent1"/>
+            </a:effectRef>
+            <a:fontRef idx="minor">
+              <a:schemeClr val="tx1"/>
+            </a:fontRef>
+          </p:style>
+          <p:txBody>
+            <a:bodyPr rtlCol="0" anchor="ctr"/>
+            <a:lstStyle/>
+            <a:p>
+              <a:pPr algn="ctr"/>
+              <a:endParaRPr lang="en-GB" dirty="0"/>
+            </a:p>
+          </p:txBody>
+        </p:sp>
+        <p:sp>
+          <p:nvSpPr>
+            <p:cNvPr id="9" name="Arc 8">
+              <a:extLst>
+                <a:ext uri="{FF2B5EF4-FFF2-40B4-BE49-F238E27FC236}">
+                  <a16:creationId xmlns:a16="http://schemas.microsoft.com/office/drawing/2014/main" id="{4ECEAB58-8B9A-DD42-BB81-9C438CF8429D}"/>
+                </a:ext>
+              </a:extLst>
+            </p:cNvPr>
+            <p:cNvSpPr/>
+            <p:nvPr/>
+          </p:nvSpPr>
+          <p:spPr>
+            <a:xfrm>
+              <a:off x="864000" y="2291330"/>
+              <a:ext cx="5302158" cy="5943692"/>
+            </a:xfrm>
+            <a:prstGeom prst="arc">
+              <a:avLst>
+                <a:gd name="adj1" fmla="val 17333990"/>
+                <a:gd name="adj2" fmla="val 21125606"/>
+              </a:avLst>
+            </a:prstGeom>
+            <a:ln w="22225">
+              <a:solidFill>
+                <a:schemeClr val="bg1"/>
+              </a:solidFill>
+              <a:headEnd type="stealth" w="lg" len="lg"/>
+              <a:tailEnd type="none" w="lg" len="lg"/>
+            </a:ln>
+          </p:spPr>
+          <p:style>
+            <a:lnRef idx="1">
+              <a:schemeClr val="accent1"/>
+            </a:lnRef>
+            <a:fillRef idx="0">
+              <a:schemeClr val="accent1"/>
+            </a:fillRef>
+            <a:effectRef idx="0">
+              <a:schemeClr val="accent1"/>
+            </a:effectRef>
+            <a:fontRef idx="minor">
+              <a:schemeClr val="tx1"/>
+            </a:fontRef>
+          </p:style>
+          <p:txBody>
+            <a:bodyPr rtlCol="0" anchor="ctr"/>
+            <a:lstStyle/>
+            <a:p>
+              <a:pPr algn="ctr"/>
+              <a:endParaRPr lang="en-GB" dirty="0"/>
+            </a:p>
+          </p:txBody>
+        </p:sp>
+      </p:grpSp>
+    </p:spTree>
+    <p:extLst>
+      <p:ext uri="{BB962C8B-B14F-4D97-AF65-F5344CB8AC3E}">
+        <p14:creationId xmlns:p14="http://schemas.microsoft.com/office/powerpoint/2010/main" val="653855043"/>
       </p:ext>
     </p:extLst>
   </p:cSld>

</xml_diff>